<commit_message>
Update Pico and Gravity shield composite
</commit_message>
<xml_diff>
--- a/Composites/Pico_and_GravityShield.pptx
+++ b/Composites/Pico_and_GravityShield.pptx
@@ -3390,8 +3390,8 @@
         </p:blipFill>
         <p:spPr>
           <a:xfrm>
-            <a:off x="5310388" y="1171964"/>
-            <a:ext cx="1503063" cy="3794730"/>
+            <a:off x="5307806" y="1160472"/>
+            <a:ext cx="1510679" cy="3813959"/>
           </a:xfrm>
           <a:prstGeom prst="rect">
             <a:avLst/>

</xml_diff>